<commit_message>
En la ultima dispositiva de la presentacion estan las sugerencias del profe
</commit_message>
<xml_diff>
--- a/Semana 24-28 agosto/Presentación.pptx
+++ b/Semana 24-28 agosto/Presentación.pptx
@@ -21,6 +21,7 @@
     <p:sldId id="269" r:id="rId15"/>
     <p:sldId id="270" r:id="rId16"/>
     <p:sldId id="271" r:id="rId17"/>
+    <p:sldId id="272" r:id="rId18"/>
   </p:sldIdLst>
   <p:sldSz cx="12192000" cy="6858000"/>
   <p:notesSz cx="6858000" cy="9144000"/>
@@ -330,7 +331,7 @@
           <a:p>
             <a:fld id="{2710D3AE-FC74-48CA-9837-334DBB8DC910}" type="slidenum">
               <a:rPr lang="es-CO" smtClean="0"/>
-              <a:t>‹Nº›</a:t>
+              <a:t>‹#›</a:t>
             </a:fld>
             <a:endParaRPr lang="es-CO"/>
           </a:p>
@@ -530,7 +531,7 @@
           <a:p>
             <a:fld id="{2710D3AE-FC74-48CA-9837-334DBB8DC910}" type="slidenum">
               <a:rPr lang="es-CO" smtClean="0"/>
-              <a:t>‹Nº›</a:t>
+              <a:t>‹#›</a:t>
             </a:fld>
             <a:endParaRPr lang="es-CO"/>
           </a:p>
@@ -740,7 +741,7 @@
           <a:p>
             <a:fld id="{2710D3AE-FC74-48CA-9837-334DBB8DC910}" type="slidenum">
               <a:rPr lang="es-CO" smtClean="0"/>
-              <a:t>‹Nº›</a:t>
+              <a:t>‹#›</a:t>
             </a:fld>
             <a:endParaRPr lang="es-CO"/>
           </a:p>
@@ -940,7 +941,7 @@
           <a:p>
             <a:fld id="{2710D3AE-FC74-48CA-9837-334DBB8DC910}" type="slidenum">
               <a:rPr lang="es-CO" smtClean="0"/>
-              <a:t>‹Nº›</a:t>
+              <a:t>‹#›</a:t>
             </a:fld>
             <a:endParaRPr lang="es-CO"/>
           </a:p>
@@ -1216,7 +1217,7 @@
           <a:p>
             <a:fld id="{2710D3AE-FC74-48CA-9837-334DBB8DC910}" type="slidenum">
               <a:rPr lang="es-CO" smtClean="0"/>
-              <a:t>‹Nº›</a:t>
+              <a:t>‹#›</a:t>
             </a:fld>
             <a:endParaRPr lang="es-CO"/>
           </a:p>
@@ -1484,7 +1485,7 @@
           <a:p>
             <a:fld id="{2710D3AE-FC74-48CA-9837-334DBB8DC910}" type="slidenum">
               <a:rPr lang="es-CO" smtClean="0"/>
-              <a:t>‹Nº›</a:t>
+              <a:t>‹#›</a:t>
             </a:fld>
             <a:endParaRPr lang="es-CO"/>
           </a:p>
@@ -1899,7 +1900,7 @@
           <a:p>
             <a:fld id="{2710D3AE-FC74-48CA-9837-334DBB8DC910}" type="slidenum">
               <a:rPr lang="es-CO" smtClean="0"/>
-              <a:t>‹Nº›</a:t>
+              <a:t>‹#›</a:t>
             </a:fld>
             <a:endParaRPr lang="es-CO"/>
           </a:p>
@@ -2041,7 +2042,7 @@
           <a:p>
             <a:fld id="{2710D3AE-FC74-48CA-9837-334DBB8DC910}" type="slidenum">
               <a:rPr lang="es-CO" smtClean="0"/>
-              <a:t>‹Nº›</a:t>
+              <a:t>‹#›</a:t>
             </a:fld>
             <a:endParaRPr lang="es-CO"/>
           </a:p>
@@ -2154,7 +2155,7 @@
           <a:p>
             <a:fld id="{2710D3AE-FC74-48CA-9837-334DBB8DC910}" type="slidenum">
               <a:rPr lang="es-CO" smtClean="0"/>
-              <a:t>‹Nº›</a:t>
+              <a:t>‹#›</a:t>
             </a:fld>
             <a:endParaRPr lang="es-CO"/>
           </a:p>
@@ -2467,7 +2468,7 @@
           <a:p>
             <a:fld id="{2710D3AE-FC74-48CA-9837-334DBB8DC910}" type="slidenum">
               <a:rPr lang="es-CO" smtClean="0"/>
-              <a:t>‹Nº›</a:t>
+              <a:t>‹#›</a:t>
             </a:fld>
             <a:endParaRPr lang="es-CO"/>
           </a:p>
@@ -2756,7 +2757,7 @@
           <a:p>
             <a:fld id="{2710D3AE-FC74-48CA-9837-334DBB8DC910}" type="slidenum">
               <a:rPr lang="es-CO" smtClean="0"/>
-              <a:t>‹Nº›</a:t>
+              <a:t>‹#›</a:t>
             </a:fld>
             <a:endParaRPr lang="es-CO"/>
           </a:p>
@@ -3035,7 +3036,7 @@
           <a:p>
             <a:fld id="{2710D3AE-FC74-48CA-9837-334DBB8DC910}" type="slidenum">
               <a:rPr lang="es-CO" smtClean="0"/>
-              <a:t>‹Nº›</a:t>
+              <a:t>‹#›</a:t>
             </a:fld>
             <a:endParaRPr lang="es-CO"/>
           </a:p>
@@ -4356,7 +4357,7 @@
         <p:spPr>
           <a:xfrm>
             <a:off x="4406718" y="4352948"/>
-            <a:ext cx="3312734" cy="1141851"/>
+            <a:ext cx="3312734" cy="2606652"/>
           </a:xfrm>
           <a:noFill/>
         </p:spPr>
@@ -4382,21 +4383,8 @@
                   <a:srgbClr val="080808"/>
                 </a:solidFill>
               </a:rPr>
-              <a:t>Guillermo Toloza </a:t>
-            </a:r>
-            <a:r>
-              <a:rPr lang="es-CO" sz="1500" dirty="0" err="1">
-                <a:solidFill>
-                  <a:srgbClr val="080808"/>
-                </a:solidFill>
-              </a:rPr>
-              <a:t>Guzman</a:t>
-            </a:r>
-            <a:endParaRPr lang="es-CO" sz="1500" dirty="0">
-              <a:solidFill>
-                <a:srgbClr val="080808"/>
-              </a:solidFill>
-            </a:endParaRPr>
+              <a:t>Guillermo Toloza Guzmán</a:t>
+            </a:r>
           </a:p>
           <a:p>
             <a:r>
@@ -4415,21 +4403,8 @@
                   <a:srgbClr val="080808"/>
                 </a:solidFill>
               </a:rPr>
-              <a:t>Santiago Tamayo </a:t>
-            </a:r>
-            <a:r>
-              <a:rPr lang="es-CO" sz="1500" dirty="0" err="1">
-                <a:solidFill>
-                  <a:srgbClr val="080808"/>
-                </a:solidFill>
-              </a:rPr>
-              <a:t>Lopez</a:t>
-            </a:r>
-            <a:endParaRPr lang="es-CO" sz="1500" dirty="0">
-              <a:solidFill>
-                <a:srgbClr val="080808"/>
-              </a:solidFill>
-            </a:endParaRPr>
+              <a:t>Santiago Tamayo López</a:t>
+            </a:r>
           </a:p>
           <a:p>
             <a:r>
@@ -4438,21 +4413,8 @@
                   <a:srgbClr val="080808"/>
                 </a:solidFill>
               </a:rPr>
-              <a:t>Mariana Betancur </a:t>
-            </a:r>
-            <a:r>
-              <a:rPr lang="es-CO" sz="1500" dirty="0" err="1">
-                <a:solidFill>
-                  <a:srgbClr val="080808"/>
-                </a:solidFill>
-              </a:rPr>
-              <a:t>Florez</a:t>
-            </a:r>
-            <a:endParaRPr lang="es-CO" sz="1500" dirty="0">
-              <a:solidFill>
-                <a:srgbClr val="080808"/>
-              </a:solidFill>
-            </a:endParaRPr>
+              <a:t>Mariana Betancur Flórez</a:t>
+            </a:r>
           </a:p>
           <a:p>
             <a:r>
@@ -4509,14 +4471,14 @@
           <a:lstStyle/>
           <a:p>
             <a:r>
-              <a:rPr lang="es-ES" sz="3600">
+              <a:rPr lang="es-ES" sz="3600" dirty="0">
                 <a:solidFill>
                   <a:srgbClr val="080808"/>
                 </a:solidFill>
               </a:rPr>
-              <a:t>ADMINISTRACION Y GESTION DE UNIDADES CERRADAS</a:t>
-            </a:r>
-            <a:endParaRPr lang="es-CO" sz="3600">
+              <a:t>ADMINISTRACIÓN Y GESTIÓN DE UNIDADES CERRADAS</a:t>
+            </a:r>
+            <a:endParaRPr lang="es-CO" sz="3600" dirty="0">
               <a:solidFill>
                 <a:srgbClr val="080808"/>
               </a:solidFill>
@@ -5005,36 +4967,12 @@
           </a:p>
           <a:p>
             <a:r>
-              <a:rPr lang="es-ES" sz="2200" dirty="0" err="1">
-                <a:solidFill>
-                  <a:schemeClr val="tx2"/>
-                </a:solidFill>
-              </a:rPr>
-              <a:t>Identificacion</a:t>
-            </a:r>
-            <a:r>
               <a:rPr lang="es-ES" sz="2200" dirty="0">
                 <a:solidFill>
                   <a:schemeClr val="tx2"/>
                 </a:solidFill>
               </a:rPr>
-              <a:t> de problemas y causas </a:t>
-            </a:r>
-            <a:r>
-              <a:rPr lang="es-ES" sz="2200" dirty="0" err="1">
-                <a:solidFill>
-                  <a:schemeClr val="tx2"/>
-                </a:solidFill>
-              </a:rPr>
-              <a:t>raiz</a:t>
-            </a:r>
-            <a:r>
-              <a:rPr lang="es-ES" sz="2200" dirty="0">
-                <a:solidFill>
-                  <a:schemeClr val="tx2"/>
-                </a:solidFill>
-              </a:rPr>
-              <a:t> subyacentes</a:t>
+              <a:t>Identificación de problemas y causas raíz subyacentes</a:t>
             </a:r>
           </a:p>
           <a:p>
@@ -5045,82 +4983,18 @@
                   <a:schemeClr val="tx2"/>
                 </a:solidFill>
               </a:rPr>
-              <a:t>Los procesos de </a:t>
-            </a:r>
-            <a:r>
-              <a:rPr lang="es-ES" sz="1800" dirty="0" err="1">
-                <a:solidFill>
-                  <a:schemeClr val="tx2"/>
-                </a:solidFill>
-              </a:rPr>
-              <a:t>administracion</a:t>
-            </a:r>
+              <a:t>Los procesos de administración y gestión no se encuentran optimizados y esto conlleva a que las personas, no administradoras, no tengan conocimiento de los tramites que se realizan.</a:t>
+            </a:r>
+          </a:p>
+          <a:p>
+            <a:pPr lvl="1"/>
             <a:r>
               <a:rPr lang="es-ES" sz="1800" dirty="0">
                 <a:solidFill>
                   <a:schemeClr val="tx2"/>
                 </a:solidFill>
               </a:rPr>
-              <a:t> y </a:t>
-            </a:r>
-            <a:r>
-              <a:rPr lang="es-ES" sz="1800" dirty="0" err="1">
-                <a:solidFill>
-                  <a:schemeClr val="tx2"/>
-                </a:solidFill>
-              </a:rPr>
-              <a:t>gestion</a:t>
-            </a:r>
-            <a:r>
-              <a:rPr lang="es-ES" sz="1800" dirty="0">
-                <a:solidFill>
-                  <a:schemeClr val="tx2"/>
-                </a:solidFill>
-              </a:rPr>
-              <a:t> no se encuentran optimizados y esto conlleva a que las personas, no administradoras, no tengan conocimiento de los tramites que se realizan.</a:t>
-            </a:r>
-          </a:p>
-          <a:p>
-            <a:pPr lvl="1"/>
-            <a:r>
-              <a:rPr lang="es-ES" sz="1800" dirty="0">
-                <a:solidFill>
-                  <a:schemeClr val="tx2"/>
-                </a:solidFill>
-              </a:rPr>
-              <a:t>Perdidas de tiempos. Se evitan retrasos en procesos innecesarios que se </a:t>
-            </a:r>
-            <a:r>
-              <a:rPr lang="es-ES" sz="1800" dirty="0" err="1">
-                <a:solidFill>
-                  <a:schemeClr val="tx2"/>
-                </a:solidFill>
-              </a:rPr>
-              <a:t>reemplazarian</a:t>
-            </a:r>
-            <a:r>
-              <a:rPr lang="es-ES" sz="1800" dirty="0">
-                <a:solidFill>
-                  <a:schemeClr val="tx2"/>
-                </a:solidFill>
-              </a:rPr>
-              <a:t> por algoritmos de </a:t>
-            </a:r>
-            <a:r>
-              <a:rPr lang="es-ES" sz="1800" dirty="0" err="1">
-                <a:solidFill>
-                  <a:schemeClr val="tx2"/>
-                </a:solidFill>
-              </a:rPr>
-              <a:t>busqueda</a:t>
-            </a:r>
-            <a:r>
-              <a:rPr lang="es-ES" sz="1800" dirty="0">
-                <a:solidFill>
-                  <a:schemeClr val="tx2"/>
-                </a:solidFill>
-              </a:rPr>
-              <a:t>.</a:t>
+              <a:t>Perdidas de tiempos. Se evitan retrasos en procesos innecesarios que se reemplazarían por algoritmos de búsqueda.</a:t>
             </a:r>
           </a:p>
           <a:p>
@@ -13360,6 +13234,150 @@
 </p:sld>
 </file>
 
+<file path=ppt/slides/slide17.xml><?xml version="1.0" encoding="utf-8"?>
+<p:sld xmlns:a="http://schemas.openxmlformats.org/drawingml/2006/main" xmlns:r="http://schemas.openxmlformats.org/officeDocument/2006/relationships" xmlns:p="http://schemas.openxmlformats.org/presentationml/2006/main">
+  <p:cSld>
+    <p:spTree>
+      <p:nvGrpSpPr>
+        <p:cNvPr id="1" name=""/>
+        <p:cNvGrpSpPr/>
+        <p:nvPr/>
+      </p:nvGrpSpPr>
+      <p:grpSpPr>
+        <a:xfrm>
+          <a:off x="0" y="0"/>
+          <a:ext cx="0" cy="0"/>
+          <a:chOff x="0" y="0"/>
+          <a:chExt cx="0" cy="0"/>
+        </a:xfrm>
+      </p:grpSpPr>
+      <p:sp>
+        <p:nvSpPr>
+          <p:cNvPr id="2" name="Title 1">
+            <a:extLst>
+              <a:ext uri="{FF2B5EF4-FFF2-40B4-BE49-F238E27FC236}">
+                <a16:creationId xmlns:a16="http://schemas.microsoft.com/office/drawing/2014/main" id="{1D39AB17-F74D-4408-9382-0295BE04D3E6}"/>
+              </a:ext>
+            </a:extLst>
+          </p:cNvPr>
+          <p:cNvSpPr>
+            <a:spLocks noGrp="1"/>
+          </p:cNvSpPr>
+          <p:nvPr>
+            <p:ph type="title"/>
+          </p:nvPr>
+        </p:nvSpPr>
+        <p:spPr/>
+        <p:txBody>
+          <a:bodyPr/>
+          <a:lstStyle/>
+          <a:p>
+            <a:r>
+              <a:rPr lang="en-US" dirty="0" err="1"/>
+              <a:t>Sugerencias</a:t>
+            </a:r>
+            <a:r>
+              <a:rPr lang="en-US" dirty="0"/>
+              <a:t> del </a:t>
+            </a:r>
+            <a:r>
+              <a:rPr lang="en-US" dirty="0" err="1"/>
+              <a:t>profe</a:t>
+            </a:r>
+            <a:endParaRPr lang="es-CO" dirty="0"/>
+          </a:p>
+        </p:txBody>
+      </p:sp>
+      <p:sp>
+        <p:nvSpPr>
+          <p:cNvPr id="3" name="Content Placeholder 2">
+            <a:extLst>
+              <a:ext uri="{FF2B5EF4-FFF2-40B4-BE49-F238E27FC236}">
+                <a16:creationId xmlns:a16="http://schemas.microsoft.com/office/drawing/2014/main" id="{0DFFA932-5478-42AC-8B9A-E14B00A21641}"/>
+              </a:ext>
+            </a:extLst>
+          </p:cNvPr>
+          <p:cNvSpPr>
+            <a:spLocks noGrp="1"/>
+          </p:cNvSpPr>
+          <p:nvPr>
+            <p:ph idx="1"/>
+          </p:nvPr>
+        </p:nvSpPr>
+        <p:spPr/>
+        <p:txBody>
+          <a:bodyPr/>
+          <a:lstStyle/>
+          <a:p>
+            <a:r>
+              <a:rPr lang="es-CO" dirty="0"/>
+              <a:t>Trasteos</a:t>
+            </a:r>
+          </a:p>
+          <a:p>
+            <a:r>
+              <a:rPr lang="es-CO" dirty="0"/>
+              <a:t>Cobro por mal comportamiento</a:t>
+            </a:r>
+          </a:p>
+          <a:p>
+            <a:r>
+              <a:rPr lang="es-CO" dirty="0"/>
+              <a:t>Incorporación de </a:t>
+            </a:r>
+            <a:r>
+              <a:rPr lang="es-CO" dirty="0" err="1"/>
+              <a:t>framework</a:t>
+            </a:r>
+            <a:r>
+              <a:rPr lang="es-CO" dirty="0"/>
+              <a:t> de identificación de personas </a:t>
+            </a:r>
+            <a:r>
+              <a:rPr lang="en-US" dirty="0"/>
+              <a:t>(IA)</a:t>
+            </a:r>
+            <a:endParaRPr lang="es-CO" dirty="0"/>
+          </a:p>
+          <a:p>
+            <a:r>
+              <a:rPr lang="es-CO" dirty="0"/>
+              <a:t>Entrar y salidas de visitantes</a:t>
+            </a:r>
+          </a:p>
+          <a:p>
+            <a:r>
+              <a:rPr lang="es-CO" dirty="0"/>
+              <a:t>Cámaras térmicas para matar la gente que tiene COVID</a:t>
+            </a:r>
+          </a:p>
+          <a:p>
+            <a:r>
+              <a:rPr lang="es-CO" dirty="0"/>
+              <a:t>Votaciones en las Asambleas</a:t>
+            </a:r>
+          </a:p>
+          <a:p>
+            <a:endParaRPr lang="es-CO" dirty="0"/>
+          </a:p>
+          <a:p>
+            <a:endParaRPr lang="es-CO" dirty="0"/>
+          </a:p>
+        </p:txBody>
+      </p:sp>
+    </p:spTree>
+    <p:extLst>
+      <p:ext uri="{BB962C8B-B14F-4D97-AF65-F5344CB8AC3E}">
+        <p14:creationId xmlns:p14="http://schemas.microsoft.com/office/powerpoint/2010/main" val="1729374427"/>
+      </p:ext>
+    </p:extLst>
+  </p:cSld>
+  <p:clrMapOvr>
+    <a:masterClrMapping/>
+  </p:clrMapOvr>
+</p:sld>
+</file>
+
 <file path=ppt/slides/slide2.xml><?xml version="1.0" encoding="utf-8"?>
 <p:sld xmlns:a="http://schemas.openxmlformats.org/drawingml/2006/main" xmlns:r="http://schemas.openxmlformats.org/officeDocument/2006/relationships" xmlns:p="http://schemas.openxmlformats.org/presentationml/2006/main">
   <p:cSld>
@@ -16126,26 +16144,9 @@
               <a:buNone/>
             </a:pPr>
             <a:r>
-              <a:rPr lang="en-US" sz="2400" dirty="0" err="1"/>
-              <a:t>Modelo</a:t>
-            </a:r>
-            <a:r>
-              <a:rPr lang="en-US" sz="2400" dirty="0"/>
-              <a:t> que se </a:t>
-            </a:r>
-            <a:r>
-              <a:rPr lang="en-US" sz="2400" dirty="0" err="1"/>
-              <a:t>desea</a:t>
-            </a:r>
-            <a:r>
-              <a:rPr lang="en-US" sz="2400" dirty="0"/>
-              <a:t> </a:t>
-            </a:r>
-            <a:r>
-              <a:rPr lang="en-US" sz="2400" dirty="0" err="1"/>
-              <a:t>seguir</a:t>
-            </a:r>
-            <a:endParaRPr lang="en-US" sz="2400" dirty="0"/>
+              <a:rPr lang="es-CO" sz="2400" dirty="0"/>
+              <a:t>Modelo que se desea seguir</a:t>
+            </a:r>
           </a:p>
         </p:txBody>
       </p:sp>

</xml_diff>